<commit_message>
feat: Add radar chart visualization enhancements and update report generation functionality
</commit_message>
<xml_diff>
--- a/db/Viable.pptx
+++ b/db/Viable.pptx
@@ -10454,7 +10454,7 @@
           </a:stretch>
         </p:blipFill>
         <p:spPr bwMode="auto">
-          <a:xfrm rot="2664597">
+          <a:xfrm>
             <a:off x="912171" y="1739730"/>
             <a:ext cx="4199878" cy="3680218"/>
           </a:xfrm>
@@ -15446,20 +15446,20 @@
 </file>
 
 <file path=customXml/item1.xml><?xml version="1.0" encoding="utf-8"?>
+<p:properties xmlns:p="http://schemas.microsoft.com/office/2006/metadata/properties" xmlns:xsi="http://www.w3.org/2001/XMLSchema-instance" xmlns:pc="http://schemas.microsoft.com/office/infopath/2007/PartnerControls">
+  <documentManagement>
+    <_activity xmlns="2a3a48df-fd5a-482e-a9d8-c269fe9c14b6" xsi:nil="true"/>
+  </documentManagement>
+</p:properties>
+</file>
+
+<file path=customXml/item2.xml><?xml version="1.0" encoding="utf-8"?>
 <?mso-contentType ?>
 <FormTemplates xmlns="http://schemas.microsoft.com/sharepoint/v3/contenttype/forms">
   <Display>DocumentLibraryForm</Display>
   <Edit>DocumentLibraryForm</Edit>
   <New>DocumentLibraryForm</New>
 </FormTemplates>
-</file>
-
-<file path=customXml/item2.xml><?xml version="1.0" encoding="utf-8"?>
-<p:properties xmlns:p="http://schemas.microsoft.com/office/2006/metadata/properties" xmlns:xsi="http://www.w3.org/2001/XMLSchema-instance" xmlns:pc="http://schemas.microsoft.com/office/infopath/2007/PartnerControls">
-  <documentManagement>
-    <_activity xmlns="2a3a48df-fd5a-482e-a9d8-c269fe9c14b6" xsi:nil="true"/>
-  </documentManagement>
-</p:properties>
 </file>
 
 <file path=customXml/item3.xml><?xml version="1.0" encoding="utf-8"?>
@@ -15696,14 +15696,6 @@
 </file>
 
 <file path=customXml/itemProps1.xml><?xml version="1.0" encoding="utf-8"?>
-<ds:datastoreItem xmlns:ds="http://schemas.openxmlformats.org/officeDocument/2006/customXml" ds:itemID="{6F6047D2-D757-4EBF-8A4E-358354D46A6D}">
-  <ds:schemaRefs>
-    <ds:schemaRef ds:uri="http://schemas.microsoft.com/sharepoint/v3/contenttype/forms"/>
-  </ds:schemaRefs>
-</ds:datastoreItem>
-</file>
-
-<file path=customXml/itemProps2.xml><?xml version="1.0" encoding="utf-8"?>
 <ds:datastoreItem xmlns:ds="http://schemas.openxmlformats.org/officeDocument/2006/customXml" ds:itemID="{C3961526-4550-4B91-9CB0-38571E77D286}">
   <ds:schemaRefs>
     <ds:schemaRef ds:uri="2a3a48df-fd5a-482e-a9d8-c269fe9c14b6"/>
@@ -15716,6 +15708,14 @@
     <ds:schemaRef ds:uri="http://schemas.microsoft.com/office/infopath/2007/PartnerControls"/>
     <ds:schemaRef ds:uri="http://schemas.openxmlformats.org/package/2006/metadata/core-properties"/>
     <ds:schemaRef ds:uri="http://www.w3.org/XML/1998/namespace"/>
+  </ds:schemaRefs>
+</ds:datastoreItem>
+</file>
+
+<file path=customXml/itemProps2.xml><?xml version="1.0" encoding="utf-8"?>
+<ds:datastoreItem xmlns:ds="http://schemas.openxmlformats.org/officeDocument/2006/customXml" ds:itemID="{6F6047D2-D757-4EBF-8A4E-358354D46A6D}">
+  <ds:schemaRefs>
+    <ds:schemaRef ds:uri="http://schemas.microsoft.com/sharepoint/v3/contenttype/forms"/>
   </ds:schemaRefs>
 </ds:datastoreItem>
 </file>

</xml_diff>